<commit_message>
adding ptt, implitict, explicit
</commit_message>
<xml_diff>
--- a/CLR_via_CSharp/CH13_Interfaces/Interfaces.pptx
+++ b/CLR_via_CSharp/CH13_Interfaces/Interfaces.pptx
@@ -6,6 +6,8 @@
   </p:sldMasterIdLst>
   <p:sldIdLst>
     <p:sldId id="256" r:id="rId2"/>
+    <p:sldId id="257" r:id="rId3"/>
+    <p:sldId id="258" r:id="rId4"/>
   </p:sldIdLst>
   <p:sldSz cx="12192000" cy="6858000"/>
   <p:notesSz cx="6858000" cy="9144000"/>
@@ -236,9 +238,9 @@
           <a:bodyPr/>
           <a:lstStyle/>
           <a:p>
-            <a:fld id="{8E68C7E2-FDAD-42E5-B6CD-1E3A4C30E6E2}" type="datetimeFigureOut">
+            <a:fld id="{466CE58C-78EF-4948-AB3D-D23FA3B7E6B3}" type="datetimeFigureOut">
               <a:rPr lang="en-US" smtClean="0"/>
-              <a:t>10/4/2022</a:t>
+              <a:t>10/13/2022</a:t>
             </a:fld>
             <a:endParaRPr lang="en-US"/>
           </a:p>
@@ -278,7 +280,7 @@
           <a:bodyPr/>
           <a:lstStyle/>
           <a:p>
-            <a:fld id="{69B856C8-A3D6-49DE-9F23-DB801A9ADB8E}" type="slidenum">
+            <a:fld id="{7C9D095E-DEE5-4E4F-ACE7-011C85AF9C79}" type="slidenum">
               <a:rPr lang="en-US" smtClean="0"/>
               <a:t>‹#›</a:t>
             </a:fld>
@@ -289,7 +291,7 @@
     </p:spTree>
     <p:extLst>
       <p:ext uri="{BB962C8B-B14F-4D97-AF65-F5344CB8AC3E}">
-        <p14:creationId xmlns:p14="http://schemas.microsoft.com/office/powerpoint/2010/main" val="673275911"/>
+        <p14:creationId xmlns:p14="http://schemas.microsoft.com/office/powerpoint/2010/main" val="3608854542"/>
       </p:ext>
     </p:extLst>
   </p:cSld>
@@ -406,9 +408,9 @@
           <a:bodyPr/>
           <a:lstStyle/>
           <a:p>
-            <a:fld id="{8E68C7E2-FDAD-42E5-B6CD-1E3A4C30E6E2}" type="datetimeFigureOut">
+            <a:fld id="{466CE58C-78EF-4948-AB3D-D23FA3B7E6B3}" type="datetimeFigureOut">
               <a:rPr lang="en-US" smtClean="0"/>
-              <a:t>10/4/2022</a:t>
+              <a:t>10/13/2022</a:t>
             </a:fld>
             <a:endParaRPr lang="en-US"/>
           </a:p>
@@ -448,7 +450,7 @@
           <a:bodyPr/>
           <a:lstStyle/>
           <a:p>
-            <a:fld id="{69B856C8-A3D6-49DE-9F23-DB801A9ADB8E}" type="slidenum">
+            <a:fld id="{7C9D095E-DEE5-4E4F-ACE7-011C85AF9C79}" type="slidenum">
               <a:rPr lang="en-US" smtClean="0"/>
               <a:t>‹#›</a:t>
             </a:fld>
@@ -459,7 +461,7 @@
     </p:spTree>
     <p:extLst>
       <p:ext uri="{BB962C8B-B14F-4D97-AF65-F5344CB8AC3E}">
-        <p14:creationId xmlns:p14="http://schemas.microsoft.com/office/powerpoint/2010/main" val="427833635"/>
+        <p14:creationId xmlns:p14="http://schemas.microsoft.com/office/powerpoint/2010/main" val="4236337202"/>
       </p:ext>
     </p:extLst>
   </p:cSld>
@@ -586,9 +588,9 @@
           <a:bodyPr/>
           <a:lstStyle/>
           <a:p>
-            <a:fld id="{8E68C7E2-FDAD-42E5-B6CD-1E3A4C30E6E2}" type="datetimeFigureOut">
+            <a:fld id="{466CE58C-78EF-4948-AB3D-D23FA3B7E6B3}" type="datetimeFigureOut">
               <a:rPr lang="en-US" smtClean="0"/>
-              <a:t>10/4/2022</a:t>
+              <a:t>10/13/2022</a:t>
             </a:fld>
             <a:endParaRPr lang="en-US"/>
           </a:p>
@@ -628,7 +630,7 @@
           <a:bodyPr/>
           <a:lstStyle/>
           <a:p>
-            <a:fld id="{69B856C8-A3D6-49DE-9F23-DB801A9ADB8E}" type="slidenum">
+            <a:fld id="{7C9D095E-DEE5-4E4F-ACE7-011C85AF9C79}" type="slidenum">
               <a:rPr lang="en-US" smtClean="0"/>
               <a:t>‹#›</a:t>
             </a:fld>
@@ -639,7 +641,7 @@
     </p:spTree>
     <p:extLst>
       <p:ext uri="{BB962C8B-B14F-4D97-AF65-F5344CB8AC3E}">
-        <p14:creationId xmlns:p14="http://schemas.microsoft.com/office/powerpoint/2010/main" val="3387920620"/>
+        <p14:creationId xmlns:p14="http://schemas.microsoft.com/office/powerpoint/2010/main" val="602720451"/>
       </p:ext>
     </p:extLst>
   </p:cSld>
@@ -756,9 +758,9 @@
           <a:bodyPr/>
           <a:lstStyle/>
           <a:p>
-            <a:fld id="{8E68C7E2-FDAD-42E5-B6CD-1E3A4C30E6E2}" type="datetimeFigureOut">
+            <a:fld id="{466CE58C-78EF-4948-AB3D-D23FA3B7E6B3}" type="datetimeFigureOut">
               <a:rPr lang="en-US" smtClean="0"/>
-              <a:t>10/4/2022</a:t>
+              <a:t>10/13/2022</a:t>
             </a:fld>
             <a:endParaRPr lang="en-US"/>
           </a:p>
@@ -798,7 +800,7 @@
           <a:bodyPr/>
           <a:lstStyle/>
           <a:p>
-            <a:fld id="{69B856C8-A3D6-49DE-9F23-DB801A9ADB8E}" type="slidenum">
+            <a:fld id="{7C9D095E-DEE5-4E4F-ACE7-011C85AF9C79}" type="slidenum">
               <a:rPr lang="en-US" smtClean="0"/>
               <a:t>‹#›</a:t>
             </a:fld>
@@ -809,7 +811,7 @@
     </p:spTree>
     <p:extLst>
       <p:ext uri="{BB962C8B-B14F-4D97-AF65-F5344CB8AC3E}">
-        <p14:creationId xmlns:p14="http://schemas.microsoft.com/office/powerpoint/2010/main" val="523066242"/>
+        <p14:creationId xmlns:p14="http://schemas.microsoft.com/office/powerpoint/2010/main" val="1945684636"/>
       </p:ext>
     </p:extLst>
   </p:cSld>
@@ -1002,9 +1004,9 @@
           <a:bodyPr/>
           <a:lstStyle/>
           <a:p>
-            <a:fld id="{8E68C7E2-FDAD-42E5-B6CD-1E3A4C30E6E2}" type="datetimeFigureOut">
+            <a:fld id="{466CE58C-78EF-4948-AB3D-D23FA3B7E6B3}" type="datetimeFigureOut">
               <a:rPr lang="en-US" smtClean="0"/>
-              <a:t>10/4/2022</a:t>
+              <a:t>10/13/2022</a:t>
             </a:fld>
             <a:endParaRPr lang="en-US"/>
           </a:p>
@@ -1044,7 +1046,7 @@
           <a:bodyPr/>
           <a:lstStyle/>
           <a:p>
-            <a:fld id="{69B856C8-A3D6-49DE-9F23-DB801A9ADB8E}" type="slidenum">
+            <a:fld id="{7C9D095E-DEE5-4E4F-ACE7-011C85AF9C79}" type="slidenum">
               <a:rPr lang="en-US" smtClean="0"/>
               <a:t>‹#›</a:t>
             </a:fld>
@@ -1055,7 +1057,7 @@
     </p:spTree>
     <p:extLst>
       <p:ext uri="{BB962C8B-B14F-4D97-AF65-F5344CB8AC3E}">
-        <p14:creationId xmlns:p14="http://schemas.microsoft.com/office/powerpoint/2010/main" val="188650388"/>
+        <p14:creationId xmlns:p14="http://schemas.microsoft.com/office/powerpoint/2010/main" val="3787799837"/>
       </p:ext>
     </p:extLst>
   </p:cSld>
@@ -1234,9 +1236,9 @@
           <a:bodyPr/>
           <a:lstStyle/>
           <a:p>
-            <a:fld id="{8E68C7E2-FDAD-42E5-B6CD-1E3A4C30E6E2}" type="datetimeFigureOut">
+            <a:fld id="{466CE58C-78EF-4948-AB3D-D23FA3B7E6B3}" type="datetimeFigureOut">
               <a:rPr lang="en-US" smtClean="0"/>
-              <a:t>10/4/2022</a:t>
+              <a:t>10/13/2022</a:t>
             </a:fld>
             <a:endParaRPr lang="en-US"/>
           </a:p>
@@ -1276,7 +1278,7 @@
           <a:bodyPr/>
           <a:lstStyle/>
           <a:p>
-            <a:fld id="{69B856C8-A3D6-49DE-9F23-DB801A9ADB8E}" type="slidenum">
+            <a:fld id="{7C9D095E-DEE5-4E4F-ACE7-011C85AF9C79}" type="slidenum">
               <a:rPr lang="en-US" smtClean="0"/>
               <a:t>‹#›</a:t>
             </a:fld>
@@ -1287,7 +1289,7 @@
     </p:spTree>
     <p:extLst>
       <p:ext uri="{BB962C8B-B14F-4D97-AF65-F5344CB8AC3E}">
-        <p14:creationId xmlns:p14="http://schemas.microsoft.com/office/powerpoint/2010/main" val="2428995959"/>
+        <p14:creationId xmlns:p14="http://schemas.microsoft.com/office/powerpoint/2010/main" val="2219955180"/>
       </p:ext>
     </p:extLst>
   </p:cSld>
@@ -1601,9 +1603,9 @@
           <a:bodyPr/>
           <a:lstStyle/>
           <a:p>
-            <a:fld id="{8E68C7E2-FDAD-42E5-B6CD-1E3A4C30E6E2}" type="datetimeFigureOut">
+            <a:fld id="{466CE58C-78EF-4948-AB3D-D23FA3B7E6B3}" type="datetimeFigureOut">
               <a:rPr lang="en-US" smtClean="0"/>
-              <a:t>10/4/2022</a:t>
+              <a:t>10/13/2022</a:t>
             </a:fld>
             <a:endParaRPr lang="en-US"/>
           </a:p>
@@ -1643,7 +1645,7 @@
           <a:bodyPr/>
           <a:lstStyle/>
           <a:p>
-            <a:fld id="{69B856C8-A3D6-49DE-9F23-DB801A9ADB8E}" type="slidenum">
+            <a:fld id="{7C9D095E-DEE5-4E4F-ACE7-011C85AF9C79}" type="slidenum">
               <a:rPr lang="en-US" smtClean="0"/>
               <a:t>‹#›</a:t>
             </a:fld>
@@ -1654,7 +1656,7 @@
     </p:spTree>
     <p:extLst>
       <p:ext uri="{BB962C8B-B14F-4D97-AF65-F5344CB8AC3E}">
-        <p14:creationId xmlns:p14="http://schemas.microsoft.com/office/powerpoint/2010/main" val="3912774056"/>
+        <p14:creationId xmlns:p14="http://schemas.microsoft.com/office/powerpoint/2010/main" val="2676602836"/>
       </p:ext>
     </p:extLst>
   </p:cSld>
@@ -1719,9 +1721,9 @@
           <a:bodyPr/>
           <a:lstStyle/>
           <a:p>
-            <a:fld id="{8E68C7E2-FDAD-42E5-B6CD-1E3A4C30E6E2}" type="datetimeFigureOut">
+            <a:fld id="{466CE58C-78EF-4948-AB3D-D23FA3B7E6B3}" type="datetimeFigureOut">
               <a:rPr lang="en-US" smtClean="0"/>
-              <a:t>10/4/2022</a:t>
+              <a:t>10/13/2022</a:t>
             </a:fld>
             <a:endParaRPr lang="en-US"/>
           </a:p>
@@ -1761,7 +1763,7 @@
           <a:bodyPr/>
           <a:lstStyle/>
           <a:p>
-            <a:fld id="{69B856C8-A3D6-49DE-9F23-DB801A9ADB8E}" type="slidenum">
+            <a:fld id="{7C9D095E-DEE5-4E4F-ACE7-011C85AF9C79}" type="slidenum">
               <a:rPr lang="en-US" smtClean="0"/>
               <a:t>‹#›</a:t>
             </a:fld>
@@ -1772,7 +1774,7 @@
     </p:spTree>
     <p:extLst>
       <p:ext uri="{BB962C8B-B14F-4D97-AF65-F5344CB8AC3E}">
-        <p14:creationId xmlns:p14="http://schemas.microsoft.com/office/powerpoint/2010/main" val="522409336"/>
+        <p14:creationId xmlns:p14="http://schemas.microsoft.com/office/powerpoint/2010/main" val="3427323201"/>
       </p:ext>
     </p:extLst>
   </p:cSld>
@@ -1814,9 +1816,9 @@
           <a:bodyPr/>
           <a:lstStyle/>
           <a:p>
-            <a:fld id="{8E68C7E2-FDAD-42E5-B6CD-1E3A4C30E6E2}" type="datetimeFigureOut">
+            <a:fld id="{466CE58C-78EF-4948-AB3D-D23FA3B7E6B3}" type="datetimeFigureOut">
               <a:rPr lang="en-US" smtClean="0"/>
-              <a:t>10/4/2022</a:t>
+              <a:t>10/13/2022</a:t>
             </a:fld>
             <a:endParaRPr lang="en-US"/>
           </a:p>
@@ -1856,7 +1858,7 @@
           <a:bodyPr/>
           <a:lstStyle/>
           <a:p>
-            <a:fld id="{69B856C8-A3D6-49DE-9F23-DB801A9ADB8E}" type="slidenum">
+            <a:fld id="{7C9D095E-DEE5-4E4F-ACE7-011C85AF9C79}" type="slidenum">
               <a:rPr lang="en-US" smtClean="0"/>
               <a:t>‹#›</a:t>
             </a:fld>
@@ -1867,7 +1869,7 @@
     </p:spTree>
     <p:extLst>
       <p:ext uri="{BB962C8B-B14F-4D97-AF65-F5344CB8AC3E}">
-        <p14:creationId xmlns:p14="http://schemas.microsoft.com/office/powerpoint/2010/main" val="721354503"/>
+        <p14:creationId xmlns:p14="http://schemas.microsoft.com/office/powerpoint/2010/main" val="4281824133"/>
       </p:ext>
     </p:extLst>
   </p:cSld>
@@ -2091,9 +2093,9 @@
           <a:bodyPr/>
           <a:lstStyle/>
           <a:p>
-            <a:fld id="{8E68C7E2-FDAD-42E5-B6CD-1E3A4C30E6E2}" type="datetimeFigureOut">
+            <a:fld id="{466CE58C-78EF-4948-AB3D-D23FA3B7E6B3}" type="datetimeFigureOut">
               <a:rPr lang="en-US" smtClean="0"/>
-              <a:t>10/4/2022</a:t>
+              <a:t>10/13/2022</a:t>
             </a:fld>
             <a:endParaRPr lang="en-US"/>
           </a:p>
@@ -2133,7 +2135,7 @@
           <a:bodyPr/>
           <a:lstStyle/>
           <a:p>
-            <a:fld id="{69B856C8-A3D6-49DE-9F23-DB801A9ADB8E}" type="slidenum">
+            <a:fld id="{7C9D095E-DEE5-4E4F-ACE7-011C85AF9C79}" type="slidenum">
               <a:rPr lang="en-US" smtClean="0"/>
               <a:t>‹#›</a:t>
             </a:fld>
@@ -2144,7 +2146,7 @@
     </p:spTree>
     <p:extLst>
       <p:ext uri="{BB962C8B-B14F-4D97-AF65-F5344CB8AC3E}">
-        <p14:creationId xmlns:p14="http://schemas.microsoft.com/office/powerpoint/2010/main" val="3067019965"/>
+        <p14:creationId xmlns:p14="http://schemas.microsoft.com/office/powerpoint/2010/main" val="1684683018"/>
       </p:ext>
     </p:extLst>
   </p:cSld>
@@ -2348,9 +2350,9 @@
           <a:bodyPr/>
           <a:lstStyle/>
           <a:p>
-            <a:fld id="{8E68C7E2-FDAD-42E5-B6CD-1E3A4C30E6E2}" type="datetimeFigureOut">
+            <a:fld id="{466CE58C-78EF-4948-AB3D-D23FA3B7E6B3}" type="datetimeFigureOut">
               <a:rPr lang="en-US" smtClean="0"/>
-              <a:t>10/4/2022</a:t>
+              <a:t>10/13/2022</a:t>
             </a:fld>
             <a:endParaRPr lang="en-US"/>
           </a:p>
@@ -2390,7 +2392,7 @@
           <a:bodyPr/>
           <a:lstStyle/>
           <a:p>
-            <a:fld id="{69B856C8-A3D6-49DE-9F23-DB801A9ADB8E}" type="slidenum">
+            <a:fld id="{7C9D095E-DEE5-4E4F-ACE7-011C85AF9C79}" type="slidenum">
               <a:rPr lang="en-US" smtClean="0"/>
               <a:t>‹#›</a:t>
             </a:fld>
@@ -2401,7 +2403,7 @@
     </p:spTree>
     <p:extLst>
       <p:ext uri="{BB962C8B-B14F-4D97-AF65-F5344CB8AC3E}">
-        <p14:creationId xmlns:p14="http://schemas.microsoft.com/office/powerpoint/2010/main" val="4040840718"/>
+        <p14:creationId xmlns:p14="http://schemas.microsoft.com/office/powerpoint/2010/main" val="795176105"/>
       </p:ext>
     </p:extLst>
   </p:cSld>
@@ -2561,9 +2563,9 @@
             </a:lvl1pPr>
           </a:lstStyle>
           <a:p>
-            <a:fld id="{8E68C7E2-FDAD-42E5-B6CD-1E3A4C30E6E2}" type="datetimeFigureOut">
+            <a:fld id="{466CE58C-78EF-4948-AB3D-D23FA3B7E6B3}" type="datetimeFigureOut">
               <a:rPr lang="en-US" smtClean="0"/>
-              <a:t>10/4/2022</a:t>
+              <a:t>10/13/2022</a:t>
             </a:fld>
             <a:endParaRPr lang="en-US"/>
           </a:p>
@@ -2639,7 +2641,7 @@
             </a:lvl1pPr>
           </a:lstStyle>
           <a:p>
-            <a:fld id="{69B856C8-A3D6-49DE-9F23-DB801A9ADB8E}" type="slidenum">
+            <a:fld id="{7C9D095E-DEE5-4E4F-ACE7-011C85AF9C79}" type="slidenum">
               <a:rPr lang="en-US" smtClean="0"/>
               <a:t>‹#›</a:t>
             </a:fld>
@@ -2650,7 +2652,7 @@
     </p:spTree>
     <p:extLst>
       <p:ext uri="{BB962C8B-B14F-4D97-AF65-F5344CB8AC3E}">
-        <p14:creationId xmlns:p14="http://schemas.microsoft.com/office/powerpoint/2010/main" val="2823996100"/>
+        <p14:creationId xmlns:p14="http://schemas.microsoft.com/office/powerpoint/2010/main" val="1497160872"/>
       </p:ext>
     </p:extLst>
   </p:cSld>
@@ -2973,7 +2975,7 @@
           <p:cNvPr id="2" name="Title 1">
             <a:extLst>
               <a:ext uri="{FF2B5EF4-FFF2-40B4-BE49-F238E27FC236}">
-                <a16:creationId xmlns:a16="http://schemas.microsoft.com/office/drawing/2014/main" id="{990A2131-FF9C-DCCE-ED5B-4C78F408F20A}"/>
+                <a16:creationId xmlns:a16="http://schemas.microsoft.com/office/drawing/2014/main" id="{B9DA9C8A-7528-ED16-B8E7-B6126FD2D137}"/>
               </a:ext>
             </a:extLst>
           </p:cNvPr>
@@ -3001,7 +3003,7 @@
           <p:cNvPr id="3" name="Subtitle 2">
             <a:extLst>
               <a:ext uri="{FF2B5EF4-FFF2-40B4-BE49-F238E27FC236}">
-                <a16:creationId xmlns:a16="http://schemas.microsoft.com/office/drawing/2014/main" id="{4E6AF2E2-72EA-922D-2A1E-671726466118}"/>
+                <a16:creationId xmlns:a16="http://schemas.microsoft.com/office/drawing/2014/main" id="{99BEBF8C-5566-A445-5F25-9906A863D47B}"/>
               </a:ext>
             </a:extLst>
           </p:cNvPr>
@@ -3027,7 +3029,197 @@
     </p:spTree>
     <p:extLst>
       <p:ext uri="{BB962C8B-B14F-4D97-AF65-F5344CB8AC3E}">
-        <p14:creationId xmlns:p14="http://schemas.microsoft.com/office/powerpoint/2010/main" val="324083881"/>
+        <p14:creationId xmlns:p14="http://schemas.microsoft.com/office/powerpoint/2010/main" val="4143695420"/>
+      </p:ext>
+    </p:extLst>
+  </p:cSld>
+  <p:clrMapOvr>
+    <a:masterClrMapping/>
+  </p:clrMapOvr>
+</p:sld>
+</file>
+
+<file path=ppt/slides/slide2.xml><?xml version="1.0" encoding="utf-8"?>
+<p:sld xmlns:a="http://schemas.openxmlformats.org/drawingml/2006/main" xmlns:r="http://schemas.openxmlformats.org/officeDocument/2006/relationships" xmlns:p="http://schemas.openxmlformats.org/presentationml/2006/main">
+  <p:cSld>
+    <p:spTree>
+      <p:nvGrpSpPr>
+        <p:cNvPr id="1" name=""/>
+        <p:cNvGrpSpPr/>
+        <p:nvPr/>
+      </p:nvGrpSpPr>
+      <p:grpSpPr>
+        <a:xfrm>
+          <a:off x="0" y="0"/>
+          <a:ext cx="0" cy="0"/>
+          <a:chOff x="0" y="0"/>
+          <a:chExt cx="0" cy="0"/>
+        </a:xfrm>
+      </p:grpSpPr>
+      <p:sp>
+        <p:nvSpPr>
+          <p:cNvPr id="2" name="Title 1">
+            <a:extLst>
+              <a:ext uri="{FF2B5EF4-FFF2-40B4-BE49-F238E27FC236}">
+                <a16:creationId xmlns:a16="http://schemas.microsoft.com/office/drawing/2014/main" id="{FDCF6532-1FBC-F8EA-C3F3-CCC093217F72}"/>
+              </a:ext>
+            </a:extLst>
+          </p:cNvPr>
+          <p:cNvSpPr>
+            <a:spLocks noGrp="1"/>
+          </p:cNvSpPr>
+          <p:nvPr>
+            <p:ph type="title"/>
+          </p:nvPr>
+        </p:nvSpPr>
+        <p:spPr/>
+        <p:txBody>
+          <a:bodyPr/>
+          <a:lstStyle/>
+          <a:p>
+            <a:r>
+              <a:rPr lang="en-US" dirty="0"/>
+              <a:t>Inside of </a:t>
+            </a:r>
+            <a:r>
+              <a:rPr lang="en-US" dirty="0" err="1"/>
+              <a:t>Ildasm</a:t>
+            </a:r>
+            <a:r>
+              <a:rPr lang="en-US" dirty="0"/>
+              <a:t>, we have a ‘method table’</a:t>
+            </a:r>
+          </a:p>
+        </p:txBody>
+      </p:sp>
+      <p:pic>
+        <p:nvPicPr>
+          <p:cNvPr id="5" name="Content Placeholder 4">
+            <a:extLst>
+              <a:ext uri="{FF2B5EF4-FFF2-40B4-BE49-F238E27FC236}">
+                <a16:creationId xmlns:a16="http://schemas.microsoft.com/office/drawing/2014/main" id="{199BC88C-B819-C8C8-A64D-CF351A77BA93}"/>
+              </a:ext>
+            </a:extLst>
+          </p:cNvPr>
+          <p:cNvPicPr>
+            <a:picLocks noGrp="1" noChangeAspect="1"/>
+          </p:cNvPicPr>
+          <p:nvPr>
+            <p:ph idx="1"/>
+          </p:nvPr>
+        </p:nvPicPr>
+        <p:blipFill>
+          <a:blip r:embed="rId2"/>
+          <a:stretch>
+            <a:fillRect/>
+          </a:stretch>
+        </p:blipFill>
+        <p:spPr>
+          <a:xfrm>
+            <a:off x="3978885" y="2030304"/>
+            <a:ext cx="4234229" cy="3792028"/>
+          </a:xfrm>
+        </p:spPr>
+      </p:pic>
+    </p:spTree>
+    <p:extLst>
+      <p:ext uri="{BB962C8B-B14F-4D97-AF65-F5344CB8AC3E}">
+        <p14:creationId xmlns:p14="http://schemas.microsoft.com/office/powerpoint/2010/main" val="2045030905"/>
+      </p:ext>
+    </p:extLst>
+  </p:cSld>
+  <p:clrMapOvr>
+    <a:masterClrMapping/>
+  </p:clrMapOvr>
+</p:sld>
+</file>
+
+<file path=ppt/slides/slide3.xml><?xml version="1.0" encoding="utf-8"?>
+<p:sld xmlns:a="http://schemas.openxmlformats.org/drawingml/2006/main" xmlns:r="http://schemas.openxmlformats.org/officeDocument/2006/relationships" xmlns:p="http://schemas.openxmlformats.org/presentationml/2006/main">
+  <p:cSld>
+    <p:spTree>
+      <p:nvGrpSpPr>
+        <p:cNvPr id="1" name=""/>
+        <p:cNvGrpSpPr/>
+        <p:nvPr/>
+      </p:nvGrpSpPr>
+      <p:grpSpPr>
+        <a:xfrm>
+          <a:off x="0" y="0"/>
+          <a:ext cx="0" cy="0"/>
+          <a:chOff x="0" y="0"/>
+          <a:chExt cx="0" cy="0"/>
+        </a:xfrm>
+      </p:grpSpPr>
+      <p:sp>
+        <p:nvSpPr>
+          <p:cNvPr id="2" name="Title 1">
+            <a:extLst>
+              <a:ext uri="{FF2B5EF4-FFF2-40B4-BE49-F238E27FC236}">
+                <a16:creationId xmlns:a16="http://schemas.microsoft.com/office/drawing/2014/main" id="{F2B71DF0-36FC-3D98-017A-C11C4194244A}"/>
+              </a:ext>
+            </a:extLst>
+          </p:cNvPr>
+          <p:cNvSpPr>
+            <a:spLocks noGrp="1"/>
+          </p:cNvSpPr>
+          <p:nvPr>
+            <p:ph type="title"/>
+          </p:nvPr>
+        </p:nvSpPr>
+        <p:spPr/>
+        <p:txBody>
+          <a:bodyPr/>
+          <a:lstStyle/>
+          <a:p>
+            <a:r>
+              <a:rPr lang="en-US" dirty="0"/>
+              <a:t>Looking at socket port, what do we get? </a:t>
+            </a:r>
+          </a:p>
+        </p:txBody>
+      </p:sp>
+      <p:sp>
+        <p:nvSpPr>
+          <p:cNvPr id="3" name="Content Placeholder 2">
+            <a:extLst>
+              <a:ext uri="{FF2B5EF4-FFF2-40B4-BE49-F238E27FC236}">
+                <a16:creationId xmlns:a16="http://schemas.microsoft.com/office/drawing/2014/main" id="{10D7D4B3-93FA-CA71-50CF-F8F9E73F572E}"/>
+              </a:ext>
+            </a:extLst>
+          </p:cNvPr>
+          <p:cNvSpPr>
+            <a:spLocks noGrp="1"/>
+          </p:cNvSpPr>
+          <p:nvPr>
+            <p:ph idx="1"/>
+          </p:nvPr>
+        </p:nvSpPr>
+        <p:spPr/>
+        <p:txBody>
+          <a:bodyPr/>
+          <a:lstStyle/>
+          <a:p>
+            <a:r>
+              <a:rPr lang="en-US" dirty="0"/>
+              <a:t>Virtual methods defined by Object</a:t>
+            </a:r>
+          </a:p>
+          <a:p>
+            <a:r>
+              <a:rPr lang="en-US" dirty="0"/>
+              <a:t>Implementations and signatures of the interfaces  </a:t>
+            </a:r>
+          </a:p>
+          <a:p>
+            <a:endParaRPr lang="en-US" dirty="0"/>
+          </a:p>
+        </p:txBody>
+      </p:sp>
+    </p:spTree>
+    <p:extLst>
+      <p:ext uri="{BB962C8B-B14F-4D97-AF65-F5344CB8AC3E}">
+        <p14:creationId xmlns:p14="http://schemas.microsoft.com/office/powerpoint/2010/main" val="4016044416"/>
       </p:ext>
     </p:extLst>
   </p:cSld>

</xml_diff>